<commit_message>
Template adjustment and polishing
</commit_message>
<xml_diff>
--- a/03-using.pptx
+++ b/03-using.pptx
@@ -11,17 +11,17 @@
     <p:handoutMasterId r:id="rId15"/>
   </p:handoutMasterIdLst>
   <p:sldIdLst>
-    <p:sldId id="257" r:id="rId3"/>
-    <p:sldId id="263" r:id="rId4"/>
-    <p:sldId id="1551" r:id="rId5"/>
-    <p:sldId id="1552" r:id="rId6"/>
-    <p:sldId id="1556" r:id="rId7"/>
-    <p:sldId id="265" r:id="rId8"/>
+    <p:sldId id="1562" r:id="rId3"/>
+    <p:sldId id="1563" r:id="rId4"/>
+    <p:sldId id="1564" r:id="rId5"/>
+    <p:sldId id="1565" r:id="rId6"/>
+    <p:sldId id="1566" r:id="rId7"/>
+    <p:sldId id="1567" r:id="rId8"/>
     <p:sldId id="1557" r:id="rId9"/>
     <p:sldId id="1558" r:id="rId10"/>
-    <p:sldId id="283" r:id="rId11"/>
-    <p:sldId id="261" r:id="rId12"/>
-    <p:sldId id="260" r:id="rId13"/>
+    <p:sldId id="1568" r:id="rId11"/>
+    <p:sldId id="1569" r:id="rId12"/>
+    <p:sldId id="1570" r:id="rId13"/>
   </p:sldIdLst>
   <p:sldSz cx="12436475" cy="6994525"/>
   <p:notesSz cx="6858000" cy="9144000"/>
@@ -125,29 +125,29 @@
       <p14:sectionLst xmlns:p14="http://schemas.microsoft.com/office/powerpoint/2010/main">
         <p14:section name="intro" id="{E1FBED56-7E21-C94D-8049-451270E8C32A}">
           <p14:sldIdLst>
-            <p14:sldId id="257"/>
-            <p14:sldId id="263"/>
+            <p14:sldId id="1562"/>
+            <p14:sldId id="1563"/>
           </p14:sldIdLst>
         </p14:section>
-        <p14:section name="adding web parts to pages" id="{3A7429EF-79F1-A44F-B2E7-33EA665B892A}">
+        <p14:section name="adding web parts to pages" id="{DE42E044-AD8C-453A-B341-CAC57E9BFD60}">
           <p14:sldIdLst>
-            <p14:sldId id="1551"/>
-            <p14:sldId id="1552"/>
-            <p14:sldId id="1556"/>
-            <p14:sldId id="265"/>
+            <p14:sldId id="1564"/>
+            <p14:sldId id="1565"/>
+            <p14:sldId id="1566"/>
+            <p14:sldId id="1567"/>
           </p14:sldIdLst>
         </p14:section>
-        <p14:section name="validate environment" id="{87532EFB-7744-354E-BB92-2CA4A34C0FEE}">
+        <p14:section name="validate environment" id="{5AFC8C7C-8243-4324-A34E-F598133A6936}">
           <p14:sldIdLst>
             <p14:sldId id="1557"/>
             <p14:sldId id="1558"/>
           </p14:sldIdLst>
         </p14:section>
-        <p14:section name="outro" id="{E93196B6-EFE2-3242-B776-C77C0FCFFEF1}">
+        <p14:section name="outro" id="{33968224-89AD-444C-BB86-FA4868108360}">
           <p14:sldIdLst>
-            <p14:sldId id="283"/>
-            <p14:sldId id="261"/>
-            <p14:sldId id="260"/>
+            <p14:sldId id="1568"/>
+            <p14:sldId id="1569"/>
+            <p14:sldId id="1570"/>
           </p14:sldIdLst>
         </p14:section>
       </p14:sectionLst>
@@ -228,9 +228,12 @@
             </a:lvl1pPr>
           </a:lstStyle>
           <a:p>
-            <a:endParaRPr lang="en-US" dirty="0">
-              <a:latin typeface="Segoe UI" pitchFamily="34" charset="0"/>
-            </a:endParaRPr>
+            <a:r>
+              <a:rPr lang="en-US" dirty="0">
+                <a:latin typeface="Segoe UI" pitchFamily="34" charset="0"/>
+              </a:rPr>
+              <a:t>SharePoint Framework</a:t>
+            </a:r>
           </a:p>
         </p:txBody>
       </p:sp>
@@ -265,7 +268,7 @@
               <a:rPr lang="en-US" smtClean="0">
                 <a:latin typeface="Segoe UI" pitchFamily="34" charset="0"/>
               </a:rPr>
-              <a:t>10/5/18 6:09 AM</a:t>
+              <a:t>12/20/2018 3:15 PM</a:t>
             </a:fld>
             <a:endParaRPr lang="en-US" dirty="0">
               <a:latin typeface="Segoe UI" pitchFamily="34" charset="0"/>
@@ -425,7 +428,10 @@
             </a:lvl1pPr>
           </a:lstStyle>
           <a:p>
-            <a:endParaRPr lang="en-US" dirty="0"/>
+            <a:r>
+              <a:rPr lang="en-US" dirty="0"/>
+              <a:t>SharePoint Framework</a:t>
+            </a:r>
           </a:p>
         </p:txBody>
       </p:sp>
@@ -559,7 +565,7 @@
           <a:p>
             <a:fld id="{D18B56EA-E28F-4F92-9F16-7A6F2501B303}" type="datetime8">
               <a:rPr lang="en-US" smtClean="0"/>
-              <a:t>10/5/18 6:09 AM</a:t>
+              <a:t>12/20/2018 3:15 PM</a:t>
             </a:fld>
             <a:endParaRPr lang="en-US" dirty="0"/>
           </a:p>
@@ -942,7 +948,7 @@
           <a:p>
             <a:fld id="{D18B56EA-E28F-4F92-9F16-7A6F2501B303}" type="datetime8">
               <a:rPr lang="en-US" smtClean="0"/>
-              <a:t>10/5/18 6:22 AM</a:t>
+              <a:t>12/20/2018 3:15 PM</a:t>
             </a:fld>
             <a:endParaRPr lang="en-US" dirty="0"/>
           </a:p>
@@ -1123,7 +1129,7 @@
           <a:p>
             <a:fld id="{D18B56EA-E28F-4F92-9F16-7A6F2501B303}" type="datetime8">
               <a:rPr lang="en-US" smtClean="0"/>
-              <a:t>10/5/18 6:22 AM</a:t>
+              <a:t>12/20/2018 3:15 PM</a:t>
             </a:fld>
             <a:endParaRPr lang="en-US" dirty="0"/>
           </a:p>
@@ -1458,7 +1464,7 @@
           <a:p>
             <a:fld id="{D18B56EA-E28F-4F92-9F16-7A6F2501B303}" type="datetime8">
               <a:rPr lang="en-US" smtClean="0"/>
-              <a:t>10/5/18 6:22 AM</a:t>
+              <a:t>12/20/2018 3:16 PM</a:t>
             </a:fld>
             <a:endParaRPr lang="en-US" dirty="0"/>
           </a:p>
@@ -1639,7 +1645,7 @@
           <a:p>
             <a:fld id="{D18B56EA-E28F-4F92-9F16-7A6F2501B303}" type="datetime8">
               <a:rPr lang="en-US" smtClean="0"/>
-              <a:t>10/5/18 6:22 AM</a:t>
+              <a:t>12/20/2018 3:16 PM</a:t>
             </a:fld>
             <a:endParaRPr lang="en-US" dirty="0"/>
           </a:p>
@@ -1820,7 +1826,7 @@
           <a:p>
             <a:fld id="{D18B56EA-E28F-4F92-9F16-7A6F2501B303}" type="datetime8">
               <a:rPr lang="en-US" smtClean="0"/>
-              <a:t>10/5/18 6:22 AM</a:t>
+              <a:t>12/20/2018 3:16 PM</a:t>
             </a:fld>
             <a:endParaRPr lang="en-US" dirty="0"/>
           </a:p>
@@ -2001,7 +2007,7 @@
           <a:p>
             <a:fld id="{D18B56EA-E28F-4F92-9F16-7A6F2501B303}" type="datetime8">
               <a:rPr lang="en-US" smtClean="0"/>
-              <a:t>10/5/18 6:22 AM</a:t>
+              <a:t>12/20/2018 3:16 PM</a:t>
             </a:fld>
             <a:endParaRPr lang="en-US" dirty="0"/>
           </a:p>
@@ -2182,7 +2188,7 @@
           <a:p>
             <a:fld id="{D18B56EA-E28F-4F92-9F16-7A6F2501B303}" type="datetime8">
               <a:rPr lang="en-US" smtClean="0"/>
-              <a:t>10/5/18 6:15 AM</a:t>
+              <a:t>12/20/2018 3:16 PM</a:t>
             </a:fld>
             <a:endParaRPr lang="en-US" dirty="0"/>
           </a:p>
@@ -2363,7 +2369,7 @@
           <a:p>
             <a:fld id="{D18B56EA-E28F-4F92-9F16-7A6F2501B303}" type="datetime8">
               <a:rPr lang="en-US" smtClean="0"/>
-              <a:t>10/5/18 6:15 AM</a:t>
+              <a:t>12/20/2018 3:16 PM</a:t>
             </a:fld>
             <a:endParaRPr lang="en-US" dirty="0"/>
           </a:p>
@@ -6642,7 +6648,7 @@
           <a:lstStyle/>
           <a:p>
             <a:r>
-              <a:rPr lang="en-US"/>
+              <a:rPr lang="en-US" dirty="0"/>
               <a:t>Click icon to add table</a:t>
             </a:r>
           </a:p>
@@ -7089,27 +7095,31 @@
             <p:ph type="title" hasCustomPrompt="1"/>
           </p:nvPr>
         </p:nvSpPr>
-        <p:spPr/>
+        <p:spPr>
+          <a:xfrm>
+            <a:off x="464400" y="633600"/>
+            <a:ext cx="11575200" cy="410369"/>
+          </a:xfrm>
+        </p:spPr>
         <p:txBody>
-          <a:bodyPr/>
+          <a:bodyPr vert="horz" wrap="square" lIns="0" tIns="0" rIns="0" bIns="0" rtlCol="0" anchor="t">
+            <a:spAutoFit/>
+          </a:bodyPr>
           <a:lstStyle>
             <a:lvl1pPr>
-              <a:defRPr>
-                <a:gradFill>
-                  <a:gsLst>
-                    <a:gs pos="1250">
-                      <a:schemeClr val="tx2"/>
-                    </a:gs>
-                    <a:gs pos="100000">
-                      <a:schemeClr val="tx2"/>
-                    </a:gs>
-                  </a:gsLst>
-                  <a:lin ang="5400000" scaled="0"/>
-                </a:gradFill>
+              <a:defRPr lang="en-US" sz="2800" dirty="0">
+                <a:solidFill>
+                  <a:srgbClr val="2F2F2F"/>
+                </a:solidFill>
               </a:defRPr>
             </a:lvl1pPr>
           </a:lstStyle>
           <a:p>
+            <a:pPr lvl="0">
+              <a:lnSpc>
+                <a:spcPts val="3200"/>
+              </a:lnSpc>
+            </a:pPr>
             <a:r>
               <a:rPr lang="en-US" dirty="0"/>
               <a:t>Slide for Developer Code</a:t>
@@ -7202,8 +7212,8 @@
         </p:nvSpPr>
         <p:spPr>
           <a:xfrm>
-            <a:off x="528849" y="1476622"/>
-            <a:ext cx="11378776" cy="2360774"/>
+            <a:off x="464400" y="1178952"/>
+            <a:ext cx="11575200" cy="2658444"/>
           </a:xfrm>
         </p:spPr>
         <p:txBody>
@@ -7318,38 +7328,37 @@
           <a:p>
             <a:pPr lvl="0"/>
             <a:r>
-              <a:rPr lang="en-US"/>
+              <a:rPr lang="en-US" dirty="0"/>
               <a:t>Click to edit Master text styles</a:t>
             </a:r>
           </a:p>
           <a:p>
             <a:pPr lvl="1"/>
             <a:r>
-              <a:rPr lang="en-US"/>
+              <a:rPr lang="en-US" dirty="0"/>
               <a:t>Second level</a:t>
             </a:r>
           </a:p>
           <a:p>
             <a:pPr lvl="2"/>
             <a:r>
-              <a:rPr lang="en-US"/>
+              <a:rPr lang="en-US" dirty="0"/>
               <a:t>Third level</a:t>
             </a:r>
           </a:p>
           <a:p>
             <a:pPr lvl="3"/>
             <a:r>
-              <a:rPr lang="en-US"/>
+              <a:rPr lang="en-US" dirty="0"/>
               <a:t>Fourth level</a:t>
             </a:r>
           </a:p>
           <a:p>
             <a:pPr lvl="4"/>
             <a:r>
-              <a:rPr lang="en-US"/>
+              <a:rPr lang="en-US" dirty="0"/>
               <a:t>Fifth level</a:t>
             </a:r>
-            <a:endParaRPr lang="en-US" dirty="0"/>
           </a:p>
         </p:txBody>
       </p:sp>
@@ -7386,36 +7395,6 @@
           <a:chExt cx="0" cy="0"/>
         </a:xfrm>
       </p:grpSpPr>
-      <p:pic>
-        <p:nvPicPr>
-          <p:cNvPr id="7" name="Picture 6"/>
-          <p:cNvPicPr>
-            <a:picLocks noChangeAspect="1"/>
-          </p:cNvPicPr>
-          <p:nvPr userDrawn="1"/>
-        </p:nvPicPr>
-        <p:blipFill>
-          <a:blip r:embed="rId2" cstate="screen">
-            <a:extLst>
-              <a:ext uri="{28A0092B-C50C-407E-A947-70E740481C1C}">
-                <a14:useLocalDpi xmlns:a14="http://schemas.microsoft.com/office/drawing/2010/main"/>
-              </a:ext>
-            </a:extLst>
-          </a:blip>
-          <a:stretch>
-            <a:fillRect/>
-          </a:stretch>
-        </p:blipFill>
-        <p:spPr>
-          <a:xfrm>
-            <a:off x="10933639" y="6533467"/>
-            <a:ext cx="1501954" cy="477297"/>
-          </a:xfrm>
-          <a:prstGeom prst="rect">
-            <a:avLst/>
-          </a:prstGeom>
-        </p:spPr>
-      </p:pic>
       <p:sp>
         <p:nvSpPr>
           <p:cNvPr id="2" name="Title 1"/>
@@ -7426,16 +7405,35 @@
             <p:ph type="title"/>
           </p:nvPr>
         </p:nvSpPr>
-        <p:spPr/>
+        <p:spPr>
+          <a:xfrm>
+            <a:off x="464400" y="633600"/>
+            <a:ext cx="11574000" cy="410369"/>
+          </a:xfrm>
+        </p:spPr>
         <p:txBody>
-          <a:bodyPr/>
-          <a:lstStyle/>
-          <a:p>
-            <a:r>
-              <a:rPr lang="en-US"/>
+          <a:bodyPr vert="horz" wrap="square" lIns="0" tIns="0" rIns="0" bIns="0" rtlCol="0" anchor="t">
+            <a:spAutoFit/>
+          </a:bodyPr>
+          <a:lstStyle>
+            <a:lvl1pPr>
+              <a:defRPr lang="en-US" sz="2800" dirty="0">
+                <a:solidFill>
+                  <a:srgbClr val="2F2F2F"/>
+                </a:solidFill>
+              </a:defRPr>
+            </a:lvl1pPr>
+          </a:lstStyle>
+          <a:p>
+            <a:pPr lvl="0">
+              <a:lnSpc>
+                <a:spcPts val="3200"/>
+              </a:lnSpc>
+            </a:pPr>
+            <a:r>
+              <a:rPr lang="en-US" dirty="0"/>
               <a:t>Click to edit Master title style</a:t>
             </a:r>
-            <a:endParaRPr lang="en-US" dirty="0"/>
           </a:p>
         </p:txBody>
       </p:sp>
@@ -7451,8 +7449,8 @@
         </p:nvSpPr>
         <p:spPr>
           <a:xfrm>
-            <a:off x="274638" y="1212850"/>
-            <a:ext cx="11887200" cy="1889748"/>
+            <a:off x="464400" y="1212850"/>
+            <a:ext cx="11574000" cy="1346522"/>
           </a:xfrm>
         </p:spPr>
         <p:txBody>
@@ -7460,7 +7458,7 @@
           <a:lstStyle>
             <a:lvl1pPr marL="0" indent="0">
               <a:buNone/>
-              <a:defRPr>
+              <a:defRPr sz="2400">
                 <a:solidFill>
                   <a:schemeClr val="tx2"/>
                 </a:solidFill>
@@ -7469,56 +7467,55 @@
             <a:lvl2pPr marL="0" indent="0">
               <a:buFontTx/>
               <a:buNone/>
-              <a:defRPr sz="2000"/>
+              <a:defRPr sz="1400"/>
             </a:lvl2pPr>
             <a:lvl3pPr marL="228600" indent="0">
               <a:buNone/>
-              <a:defRPr sz="1800"/>
+              <a:defRPr sz="1200"/>
             </a:lvl3pPr>
             <a:lvl4pPr marL="457200" indent="0">
               <a:buNone/>
-              <a:defRPr sz="1600"/>
+              <a:defRPr sz="1100"/>
             </a:lvl4pPr>
             <a:lvl5pPr marL="685800" indent="0">
               <a:buNone/>
-              <a:defRPr sz="1400"/>
+              <a:defRPr sz="1050"/>
             </a:lvl5pPr>
           </a:lstStyle>
           <a:p>
             <a:pPr lvl="0"/>
             <a:r>
-              <a:rPr lang="en-US"/>
+              <a:rPr lang="en-US" dirty="0"/>
               <a:t>Edit Master text styles</a:t>
             </a:r>
           </a:p>
           <a:p>
             <a:pPr lvl="1"/>
             <a:r>
-              <a:rPr lang="en-US"/>
+              <a:rPr lang="en-US" dirty="0"/>
               <a:t>Second level</a:t>
             </a:r>
           </a:p>
           <a:p>
             <a:pPr lvl="2"/>
             <a:r>
-              <a:rPr lang="en-US"/>
+              <a:rPr lang="en-US" dirty="0"/>
               <a:t>Third level</a:t>
             </a:r>
           </a:p>
           <a:p>
             <a:pPr lvl="3"/>
             <a:r>
-              <a:rPr lang="en-US"/>
+              <a:rPr lang="en-US" dirty="0"/>
               <a:t>Fourth level</a:t>
             </a:r>
           </a:p>
           <a:p>
             <a:pPr lvl="4"/>
             <a:r>
-              <a:rPr lang="en-US"/>
+              <a:rPr lang="en-US" dirty="0"/>
               <a:t>Fifth level</a:t>
             </a:r>
-            <a:endParaRPr lang="en-US" dirty="0"/>
           </a:p>
         </p:txBody>
       </p:sp>
@@ -7565,23 +7562,42 @@
             <p:ph type="title"/>
           </p:nvPr>
         </p:nvSpPr>
-        <p:spPr/>
+        <p:spPr>
+          <a:xfrm>
+            <a:off x="464400" y="633600"/>
+            <a:ext cx="11574000" cy="410369"/>
+          </a:xfrm>
+        </p:spPr>
         <p:txBody>
-          <a:bodyPr/>
-          <a:lstStyle/>
-          <a:p>
-            <a:r>
-              <a:rPr lang="en-US"/>
+          <a:bodyPr vert="horz" wrap="square" lIns="0" tIns="0" rIns="0" bIns="0" rtlCol="0" anchor="t">
+            <a:spAutoFit/>
+          </a:bodyPr>
+          <a:lstStyle>
+            <a:lvl1pPr>
+              <a:defRPr lang="en-US" sz="2800" dirty="0">
+                <a:solidFill>
+                  <a:srgbClr val="2F2F2F"/>
+                </a:solidFill>
+              </a:defRPr>
+            </a:lvl1pPr>
+          </a:lstStyle>
+          <a:p>
+            <a:pPr lvl="0">
+              <a:lnSpc>
+                <a:spcPts val="3200"/>
+              </a:lnSpc>
+            </a:pPr>
+            <a:r>
+              <a:rPr lang="en-US" dirty="0"/>
               <a:t>Click to edit Master title style</a:t>
             </a:r>
-            <a:endParaRPr lang="en-US" dirty="0"/>
           </a:p>
         </p:txBody>
       </p:sp>
     </p:spTree>
     <p:extLst>
       <p:ext uri="{BB962C8B-B14F-4D97-AF65-F5344CB8AC3E}">
-        <p14:creationId xmlns:p14="http://schemas.microsoft.com/office/powerpoint/2010/main" val="1467723100"/>
+        <p14:creationId xmlns:p14="http://schemas.microsoft.com/office/powerpoint/2010/main" val="515024452"/>
       </p:ext>
     </p:extLst>
   </p:cSld>
@@ -7623,8 +7639,8 @@
         </p:nvSpPr>
         <p:spPr>
           <a:xfrm>
-            <a:off x="274638" y="1212850"/>
-            <a:ext cx="11887200" cy="2240229"/>
+            <a:off x="464400" y="1212850"/>
+            <a:ext cx="11574000" cy="1566583"/>
           </a:xfrm>
         </p:spPr>
         <p:txBody>
@@ -7632,51 +7648,56 @@
             <a:spAutoFit/>
           </a:bodyPr>
           <a:lstStyle>
+            <a:lvl1pPr>
+              <a:defRPr sz="2400"/>
+            </a:lvl1pPr>
+            <a:lvl2pPr>
+              <a:defRPr sz="1800"/>
+            </a:lvl2pPr>
             <a:lvl3pPr>
-              <a:defRPr sz="2399"/>
+              <a:defRPr sz="1600"/>
             </a:lvl3pPr>
             <a:lvl4pPr>
-              <a:defRPr sz="1999"/>
+              <a:defRPr sz="1400"/>
             </a:lvl4pPr>
             <a:lvl5pPr>
-              <a:defRPr sz="1999"/>
+              <a:defRPr sz="1400"/>
             </a:lvl5pPr>
           </a:lstStyle>
           <a:p>
             <a:pPr lvl="0"/>
             <a:r>
-              <a:rPr lang="en-US"/>
+              <a:rPr lang="en-US" dirty="0"/>
               <a:t>Edit Master text styles</a:t>
             </a:r>
           </a:p>
           <a:p>
             <a:pPr lvl="1"/>
             <a:r>
-              <a:rPr lang="en-US"/>
+              <a:rPr lang="en-US" dirty="0"/>
               <a:t>Second level</a:t>
             </a:r>
           </a:p>
           <a:p>
             <a:pPr lvl="2"/>
             <a:r>
-              <a:rPr lang="en-US"/>
+              <a:rPr lang="en-US" dirty="0"/>
               <a:t>Third level</a:t>
             </a:r>
           </a:p>
           <a:p>
             <a:pPr lvl="3"/>
             <a:r>
-              <a:rPr lang="en-US"/>
+              <a:rPr lang="en-US" dirty="0"/>
               <a:t>Fourth level</a:t>
             </a:r>
           </a:p>
           <a:p>
             <a:pPr lvl="4"/>
             <a:r>
-              <a:rPr lang="en-US"/>
+              <a:rPr lang="en-US" dirty="0"/>
               <a:t>Fifth level</a:t>
             </a:r>
-            <a:endParaRPr lang="en-US" dirty="0"/>
           </a:p>
         </p:txBody>
       </p:sp>
@@ -7690,13 +7711,33 @@
             <p:ph type="title"/>
           </p:nvPr>
         </p:nvSpPr>
-        <p:spPr/>
+        <p:spPr>
+          <a:xfrm>
+            <a:off x="464400" y="633600"/>
+            <a:ext cx="11574000" cy="410369"/>
+          </a:xfrm>
+        </p:spPr>
         <p:txBody>
-          <a:bodyPr/>
-          <a:lstStyle/>
-          <a:p>
-            <a:r>
-              <a:rPr lang="en-US"/>
+          <a:bodyPr vert="horz" wrap="square" lIns="0" tIns="0" rIns="0" bIns="0" rtlCol="0" anchor="t">
+            <a:spAutoFit/>
+          </a:bodyPr>
+          <a:lstStyle>
+            <a:lvl1pPr>
+              <a:defRPr lang="en-US" sz="2800">
+                <a:solidFill>
+                  <a:srgbClr val="2F2F2F"/>
+                </a:solidFill>
+              </a:defRPr>
+            </a:lvl1pPr>
+          </a:lstStyle>
+          <a:p>
+            <a:pPr lvl="0">
+              <a:lnSpc>
+                <a:spcPts val="3200"/>
+              </a:lnSpc>
+            </a:pPr>
+            <a:r>
+              <a:rPr lang="en-US" dirty="0"/>
               <a:t>Click to edit Master title style</a:t>
             </a:r>
           </a:p>
@@ -7705,7 +7746,7 @@
     </p:spTree>
     <p:extLst>
       <p:ext uri="{BB962C8B-B14F-4D97-AF65-F5344CB8AC3E}">
-        <p14:creationId xmlns:p14="http://schemas.microsoft.com/office/powerpoint/2010/main" val="3733558018"/>
+        <p14:creationId xmlns:p14="http://schemas.microsoft.com/office/powerpoint/2010/main" val="2439250095"/>
       </p:ext>
     </p:extLst>
   </p:cSld>
@@ -14617,7 +14658,7 @@
     <p:sldLayoutId id="2147484552" r:id="rId26"/>
     <p:sldLayoutId id="2147484556" r:id="rId27"/>
     <p:sldLayoutId id="2147484557" r:id="rId28"/>
-    <p:sldLayoutId id="2147484558" r:id="rId29"/>
+    <p:sldLayoutId id="2147484559" r:id="rId29"/>
   </p:sldLayoutIdLst>
   <p:transition>
     <p:fade/>
@@ -15180,7 +15221,7 @@
     </p:spTree>
     <p:extLst>
       <p:ext uri="{BB962C8B-B14F-4D97-AF65-F5344CB8AC3E}">
-        <p14:creationId xmlns:p14="http://schemas.microsoft.com/office/powerpoint/2010/main" val="699719167"/>
+        <p14:creationId xmlns:p14="http://schemas.microsoft.com/office/powerpoint/2010/main" val="3811075373"/>
       </p:ext>
     </p:extLst>
   </p:cSld>
@@ -15244,7 +15285,7 @@
     </p:spTree>
     <p:extLst>
       <p:ext uri="{BB962C8B-B14F-4D97-AF65-F5344CB8AC3E}">
-        <p14:creationId xmlns:p14="http://schemas.microsoft.com/office/powerpoint/2010/main" val="3724015835"/>
+        <p14:creationId xmlns:p14="http://schemas.microsoft.com/office/powerpoint/2010/main" val="2526297767"/>
       </p:ext>
     </p:extLst>
   </p:cSld>
@@ -15286,7 +15327,7 @@
     </p:spTree>
     <p:extLst>
       <p:ext uri="{BB962C8B-B14F-4D97-AF65-F5344CB8AC3E}">
-        <p14:creationId xmlns:p14="http://schemas.microsoft.com/office/powerpoint/2010/main" val="3660847957"/>
+        <p14:creationId xmlns:p14="http://schemas.microsoft.com/office/powerpoint/2010/main" val="1500130403"/>
       </p:ext>
     </p:extLst>
   </p:cSld>
@@ -15560,7 +15601,7 @@
     </p:spTree>
     <p:extLst>
       <p:ext uri="{BB962C8B-B14F-4D97-AF65-F5344CB8AC3E}">
-        <p14:creationId xmlns:p14="http://schemas.microsoft.com/office/powerpoint/2010/main" val="60090990"/>
+        <p14:creationId xmlns:p14="http://schemas.microsoft.com/office/powerpoint/2010/main" val="1349393287"/>
       </p:ext>
     </p:extLst>
   </p:cSld>
@@ -15633,7 +15674,7 @@
             <a:grpFill/>
             <a:ln w="38100">
               <a:solidFill>
-                <a:schemeClr val="accent1"/>
+                <a:schemeClr val="accent2"/>
               </a:solidFill>
               <a:headEnd type="none"/>
               <a:tailEnd type="none"/>
@@ -15670,9 +15711,7 @@
             </a:prstGeom>
             <a:grpFill/>
             <a:ln>
-              <a:solidFill>
-                <a:schemeClr val="accent1"/>
-              </a:solidFill>
+              <a:noFill/>
               <a:headEnd type="none" w="med" len="med"/>
               <a:tailEnd type="none" w="med" len="med"/>
             </a:ln>
@@ -15777,7 +15816,7 @@
             <a:grpFill/>
             <a:ln w="38100">
               <a:solidFill>
-                <a:schemeClr val="accent1"/>
+                <a:schemeClr val="accent2"/>
               </a:solidFill>
               <a:headEnd type="none"/>
               <a:tailEnd type="none"/>
@@ -15814,9 +15853,7 @@
             </a:prstGeom>
             <a:grpFill/>
             <a:ln>
-              <a:solidFill>
-                <a:schemeClr val="accent1"/>
-              </a:solidFill>
+              <a:noFill/>
               <a:headEnd type="none" w="med" len="med"/>
               <a:tailEnd type="none" w="med" len="med"/>
             </a:ln>
@@ -15921,7 +15958,7 @@
             <a:grpFill/>
             <a:ln w="38100">
               <a:solidFill>
-                <a:schemeClr val="accent1"/>
+                <a:schemeClr val="accent2"/>
               </a:solidFill>
               <a:headEnd type="none"/>
               <a:tailEnd type="none"/>
@@ -15958,9 +15995,7 @@
             </a:prstGeom>
             <a:grpFill/>
             <a:ln>
-              <a:solidFill>
-                <a:schemeClr val="accent1"/>
-              </a:solidFill>
+              <a:noFill/>
               <a:headEnd type="none" w="med" len="med"/>
               <a:tailEnd type="none" w="med" len="med"/>
             </a:ln>
@@ -16065,7 +16100,7 @@
             <a:grpFill/>
             <a:ln w="38100">
               <a:solidFill>
-                <a:schemeClr val="accent1"/>
+                <a:schemeClr val="accent2"/>
               </a:solidFill>
               <a:headEnd type="none"/>
               <a:tailEnd type="none"/>
@@ -16102,9 +16137,7 @@
             </a:prstGeom>
             <a:grpFill/>
             <a:ln>
-              <a:solidFill>
-                <a:schemeClr val="accent1"/>
-              </a:solidFill>
+              <a:noFill/>
               <a:headEnd type="none" w="med" len="med"/>
               <a:tailEnd type="none" w="med" len="med"/>
             </a:ln>
@@ -16183,8 +16216,8 @@
         </p:nvSpPr>
         <p:spPr>
           <a:xfrm>
-            <a:off x="655448" y="1687474"/>
-            <a:ext cx="3180258" cy="1464574"/>
+            <a:off x="485743" y="1687474"/>
+            <a:ext cx="3349963" cy="1464574"/>
           </a:xfrm>
           <a:prstGeom prst="rect">
             <a:avLst/>
@@ -16235,7 +16268,7 @@
                 <a:uFillTx/>
                 <a:latin typeface="+mj-lt"/>
               </a:rPr>
-              <a:t>Configurable, reusable, purpose built components</a:t>
+              <a:t>Configurable, reusable, purpose-built components</a:t>
             </a:r>
           </a:p>
         </p:txBody>
@@ -17295,14 +17328,23 @@
             <p:ph type="title"/>
           </p:nvPr>
         </p:nvSpPr>
-        <p:spPr/>
+        <p:spPr>
+          <a:xfrm>
+            <a:off x="464400" y="633600"/>
+            <a:ext cx="11574000" cy="387798"/>
+          </a:xfrm>
+        </p:spPr>
         <p:txBody>
           <a:bodyPr/>
           <a:lstStyle/>
           <a:p>
             <a:r>
-              <a:rPr lang="en-US" dirty="0"/>
-              <a:t>SharePoint web parts</a:t>
+              <a:rPr lang="en-US"/>
+              <a:t>SharePoint client-side web </a:t>
+            </a:r>
+            <a:r>
+              <a:rPr lang="en-US" dirty="0"/>
+              <a:t>parts</a:t>
             </a:r>
           </a:p>
         </p:txBody>
@@ -19311,8 +19353,8 @@
         </p:nvSpPr>
         <p:spPr>
           <a:xfrm>
-            <a:off x="274638" y="1212850"/>
-            <a:ext cx="11887200" cy="3730252"/>
+            <a:off x="464400" y="1212850"/>
+            <a:ext cx="11574000" cy="3360920"/>
           </a:xfrm>
         </p:spPr>
         <p:txBody>
@@ -19323,6 +19365,12 @@
               <a:rPr lang="en-US" dirty="0"/>
               <a:t>Once a page is in edit mode, add via web part toolbox</a:t>
             </a:r>
+          </a:p>
+          <a:p>
+            <a:endParaRPr lang="en-US" dirty="0"/>
+          </a:p>
+          <a:p>
+            <a:endParaRPr lang="en-US" dirty="0"/>
           </a:p>
           <a:p>
             <a:endParaRPr lang="en-US" dirty="0"/>
@@ -19402,7 +19450,7 @@
         </p:blipFill>
         <p:spPr>
           <a:xfrm>
-            <a:off x="2665741" y="2062541"/>
+            <a:off x="2591179" y="1993488"/>
             <a:ext cx="7104993" cy="1799644"/>
           </a:xfrm>
           <a:prstGeom prst="rect">
@@ -19462,7 +19510,7 @@
         </p:blipFill>
         <p:spPr>
           <a:xfrm>
-            <a:off x="826054" y="5008552"/>
+            <a:off x="933778" y="4742651"/>
             <a:ext cx="5317622" cy="1775016"/>
           </a:xfrm>
           <a:prstGeom prst="rect">
@@ -19522,7 +19570,7 @@
         </p:blipFill>
         <p:spPr>
           <a:xfrm>
-            <a:off x="6695091" y="4943102"/>
+            <a:off x="6883628" y="4742651"/>
             <a:ext cx="4331630" cy="1905917"/>
           </a:xfrm>
           <a:prstGeom prst="rect">
@@ -19680,12 +19728,7 @@
             <p:ph type="body" sz="quarter" idx="10"/>
           </p:nvPr>
         </p:nvSpPr>
-        <p:spPr>
-          <a:xfrm>
-            <a:off x="274638" y="1212850"/>
-            <a:ext cx="11887200" cy="5761577"/>
-          </a:xfrm>
-        </p:spPr>
+        <p:spPr/>
         <p:txBody>
           <a:bodyPr/>
           <a:lstStyle/>
@@ -19780,15 +19823,15 @@
           <a:lstStyle/>
           <a:p>
             <a:r>
-              <a:rPr lang="en-US" sz="4400" dirty="0"/>
+              <a:rPr lang="en-US" dirty="0"/>
               <a:t>Validate local </a:t>
             </a:r>
             <a:r>
-              <a:rPr lang="en-US" sz="4400" dirty="0" err="1"/>
+              <a:rPr lang="en-US" dirty="0" err="1"/>
               <a:t>SPFx</a:t>
             </a:r>
             <a:r>
-              <a:rPr lang="en-US" sz="4400" dirty="0"/>
+              <a:rPr lang="en-US" dirty="0"/>
               <a:t> development configuration</a:t>
             </a:r>
           </a:p>
@@ -19810,7 +19853,7 @@
         </p:nvSpPr>
         <p:spPr bwMode="auto">
           <a:xfrm>
-            <a:off x="709404" y="4431081"/>
+            <a:off x="851565" y="3497262"/>
             <a:ext cx="8749906" cy="587441"/>
           </a:xfrm>
           <a:prstGeom prst="rect">
@@ -19918,7 +19961,7 @@
         </p:nvSpPr>
         <p:spPr bwMode="auto">
           <a:xfrm>
-            <a:off x="625322" y="6266924"/>
+            <a:off x="851565" y="4678984"/>
             <a:ext cx="8749906" cy="587441"/>
           </a:xfrm>
           <a:prstGeom prst="rect">
@@ -20556,7 +20599,7 @@
     </p:spTree>
     <p:extLst>
       <p:ext uri="{BB962C8B-B14F-4D97-AF65-F5344CB8AC3E}">
-        <p14:creationId xmlns:p14="http://schemas.microsoft.com/office/powerpoint/2010/main" val="2509242320"/>
+        <p14:creationId xmlns:p14="http://schemas.microsoft.com/office/powerpoint/2010/main" val="2528461008"/>
       </p:ext>
     </p:extLst>
   </p:cSld>

</xml_diff>

<commit_message>
Update Ex 3 slide deck
</commit_message>
<xml_diff>
--- a/03-using.pptx
+++ b/03-using.pptx
@@ -268,7 +268,7 @@
               <a:rPr lang="en-US" smtClean="0">
                 <a:latin typeface="Segoe UI" pitchFamily="34" charset="0"/>
               </a:rPr>
-              <a:t>12/20/2018 3:15 PM</a:t>
+              <a:t>8/25/2019 5:33 PM</a:t>
             </a:fld>
             <a:endParaRPr lang="en-US" dirty="0">
               <a:latin typeface="Segoe UI" pitchFamily="34" charset="0"/>
@@ -565,7 +565,7 @@
           <a:p>
             <a:fld id="{D18B56EA-E28F-4F92-9F16-7A6F2501B303}" type="datetime8">
               <a:rPr lang="en-US" smtClean="0"/>
-              <a:t>12/20/2018 3:15 PM</a:t>
+              <a:t>8/25/2019 5:32 PM</a:t>
             </a:fld>
             <a:endParaRPr lang="en-US" dirty="0"/>
           </a:p>
@@ -948,7 +948,7 @@
           <a:p>
             <a:fld id="{D18B56EA-E28F-4F92-9F16-7A6F2501B303}" type="datetime8">
               <a:rPr lang="en-US" smtClean="0"/>
-              <a:t>12/20/2018 3:15 PM</a:t>
+              <a:t>8/25/2019 5:32 PM</a:t>
             </a:fld>
             <a:endParaRPr lang="en-US" dirty="0"/>
           </a:p>
@@ -1129,7 +1129,7 @@
           <a:p>
             <a:fld id="{D18B56EA-E28F-4F92-9F16-7A6F2501B303}" type="datetime8">
               <a:rPr lang="en-US" smtClean="0"/>
-              <a:t>12/20/2018 3:15 PM</a:t>
+              <a:t>8/25/2019 5:32 PM</a:t>
             </a:fld>
             <a:endParaRPr lang="en-US" dirty="0"/>
           </a:p>
@@ -1464,7 +1464,7 @@
           <a:p>
             <a:fld id="{D18B56EA-E28F-4F92-9F16-7A6F2501B303}" type="datetime8">
               <a:rPr lang="en-US" smtClean="0"/>
-              <a:t>12/20/2018 3:16 PM</a:t>
+              <a:t>8/25/2019 5:32 PM</a:t>
             </a:fld>
             <a:endParaRPr lang="en-US" dirty="0"/>
           </a:p>
@@ -1645,7 +1645,7 @@
           <a:p>
             <a:fld id="{D18B56EA-E28F-4F92-9F16-7A6F2501B303}" type="datetime8">
               <a:rPr lang="en-US" smtClean="0"/>
-              <a:t>12/20/2018 3:16 PM</a:t>
+              <a:t>8/25/2019 5:32 PM</a:t>
             </a:fld>
             <a:endParaRPr lang="en-US" dirty="0"/>
           </a:p>
@@ -1826,7 +1826,7 @@
           <a:p>
             <a:fld id="{D18B56EA-E28F-4F92-9F16-7A6F2501B303}" type="datetime8">
               <a:rPr lang="en-US" smtClean="0"/>
-              <a:t>12/20/2018 3:16 PM</a:t>
+              <a:t>8/25/2019 5:32 PM</a:t>
             </a:fld>
             <a:endParaRPr lang="en-US" dirty="0"/>
           </a:p>
@@ -2007,7 +2007,7 @@
           <a:p>
             <a:fld id="{D18B56EA-E28F-4F92-9F16-7A6F2501B303}" type="datetime8">
               <a:rPr lang="en-US" smtClean="0"/>
-              <a:t>12/20/2018 3:16 PM</a:t>
+              <a:t>8/25/2019 5:32 PM</a:t>
             </a:fld>
             <a:endParaRPr lang="en-US" dirty="0"/>
           </a:p>
@@ -2188,7 +2188,7 @@
           <a:p>
             <a:fld id="{D18B56EA-E28F-4F92-9F16-7A6F2501B303}" type="datetime8">
               <a:rPr lang="en-US" smtClean="0"/>
-              <a:t>12/20/2018 3:16 PM</a:t>
+              <a:t>8/25/2019 5:32 PM</a:t>
             </a:fld>
             <a:endParaRPr lang="en-US" dirty="0"/>
           </a:p>
@@ -2369,7 +2369,7 @@
           <a:p>
             <a:fld id="{D18B56EA-E28F-4F92-9F16-7A6F2501B303}" type="datetime8">
               <a:rPr lang="en-US" smtClean="0"/>
-              <a:t>12/20/2018 3:16 PM</a:t>
+              <a:t>8/25/2019 5:32 PM</a:t>
             </a:fld>
             <a:endParaRPr lang="en-US" dirty="0"/>
           </a:p>
@@ -19354,7 +19354,7 @@
         <p:spPr>
           <a:xfrm>
             <a:off x="464400" y="1212850"/>
-            <a:ext cx="11574000" cy="3360920"/>
+            <a:ext cx="11613300" cy="2880789"/>
           </a:xfrm>
         </p:spPr>
         <p:txBody>
@@ -19363,7 +19363,14 @@
           <a:p>
             <a:r>
               <a:rPr lang="en-US" dirty="0"/>
-              <a:t>Once a page is in edit mode, add via web part toolbox</a:t>
+              <a:t>Once a page is in edit mode, </a:t>
+            </a:r>
+            <a:br>
+              <a:rPr lang="en-US" dirty="0"/>
+            </a:br>
+            <a:r>
+              <a:rPr lang="en-US" dirty="0"/>
+              <a:t>add via web part toolbox</a:t>
             </a:r>
           </a:p>
           <a:p>
@@ -19379,15 +19386,9 @@
             <a:endParaRPr lang="en-US" dirty="0"/>
           </a:p>
           <a:p>
-            <a:endParaRPr lang="en-US" dirty="0"/>
-          </a:p>
-          <a:p>
-            <a:endParaRPr lang="en-US" dirty="0"/>
-          </a:p>
-          <a:p>
-            <a:r>
-              <a:rPr lang="en-US" dirty="0"/>
-              <a:t>Select a web part and edit inline / property pane</a:t>
+            <a:r>
+              <a:rPr lang="en-US" dirty="0"/>
+              <a:t>Select a web part and edit inline or using the property pane</a:t>
             </a:r>
           </a:p>
         </p:txBody>
@@ -19430,10 +19431,10 @@
       </p:sp>
       <p:pic>
         <p:nvPicPr>
-          <p:cNvPr id="5" name="Picture 4">
+          <p:cNvPr id="6" name="Picture 5">
             <a:extLst>
               <a:ext uri="{FF2B5EF4-FFF2-40B4-BE49-F238E27FC236}">
-                <a16:creationId xmlns:a16="http://schemas.microsoft.com/office/drawing/2014/main" id="{10076D68-4F5E-2140-A139-FEE7C396D7FB}"/>
+                <a16:creationId xmlns:a16="http://schemas.microsoft.com/office/drawing/2014/main" id="{F7B8E421-D7DD-4788-9FFB-4BA635224E02}"/>
               </a:ext>
             </a:extLst>
           </p:cNvPr>
@@ -19450,50 +19451,28 @@
         </p:blipFill>
         <p:spPr>
           <a:xfrm>
-            <a:off x="2591179" y="1993488"/>
-            <a:ext cx="7104993" cy="1799644"/>
+            <a:off x="6763245" y="1212850"/>
+            <a:ext cx="4572396" cy="2248095"/>
           </a:xfrm>
           <a:prstGeom prst="rect">
             <a:avLst/>
           </a:prstGeom>
-          <a:solidFill>
-            <a:srgbClr val="FFFFFF">
-              <a:shade val="85000"/>
-            </a:srgbClr>
-          </a:solidFill>
-          <a:ln w="88900" cap="sq">
+          <a:ln>
             <a:solidFill>
-              <a:srgbClr val="FFFFFF"/>
+              <a:schemeClr val="tx1">
+                <a:lumMod val="25000"/>
+                <a:lumOff val="75000"/>
+              </a:schemeClr>
             </a:solidFill>
-            <a:miter lim="800000"/>
           </a:ln>
-          <a:effectLst>
-            <a:outerShdw blurRad="55000" dist="18000" dir="5400000" algn="tl" rotWithShape="0">
-              <a:srgbClr val="000000">
-                <a:alpha val="40000"/>
-              </a:srgbClr>
-            </a:outerShdw>
-          </a:effectLst>
-          <a:scene3d>
-            <a:camera prst="orthographicFront"/>
-            <a:lightRig rig="twoPt" dir="t">
-              <a:rot lat="0" lon="0" rev="7200000"/>
-            </a:lightRig>
-          </a:scene3d>
-          <a:sp3d>
-            <a:bevelT w="25400" h="19050"/>
-            <a:contourClr>
-              <a:srgbClr val="FFFFFF"/>
-            </a:contourClr>
-          </a:sp3d>
         </p:spPr>
       </p:pic>
       <p:pic>
         <p:nvPicPr>
-          <p:cNvPr id="7" name="Picture 6">
+          <p:cNvPr id="10" name="Picture 9">
             <a:extLst>
               <a:ext uri="{FF2B5EF4-FFF2-40B4-BE49-F238E27FC236}">
-                <a16:creationId xmlns:a16="http://schemas.microsoft.com/office/drawing/2014/main" id="{1B5E086E-3CD4-124B-A818-A3E90268C28A}"/>
+                <a16:creationId xmlns:a16="http://schemas.microsoft.com/office/drawing/2014/main" id="{93F0D892-D6D7-4247-B683-731816E35B69}"/>
               </a:ext>
             </a:extLst>
           </p:cNvPr>
@@ -19510,50 +19489,28 @@
         </p:blipFill>
         <p:spPr>
           <a:xfrm>
-            <a:off x="933778" y="4742651"/>
-            <a:ext cx="5317622" cy="1775016"/>
+            <a:off x="896739" y="4261762"/>
+            <a:ext cx="4572396" cy="2598645"/>
           </a:xfrm>
           <a:prstGeom prst="rect">
             <a:avLst/>
           </a:prstGeom>
-          <a:solidFill>
-            <a:srgbClr val="FFFFFF">
-              <a:shade val="85000"/>
-            </a:srgbClr>
-          </a:solidFill>
-          <a:ln w="88900" cap="sq">
+          <a:ln>
             <a:solidFill>
-              <a:srgbClr val="FFFFFF"/>
+              <a:schemeClr val="tx1">
+                <a:lumMod val="25000"/>
+                <a:lumOff val="75000"/>
+              </a:schemeClr>
             </a:solidFill>
-            <a:miter lim="800000"/>
           </a:ln>
-          <a:effectLst>
-            <a:outerShdw blurRad="55000" dist="18000" dir="5400000" algn="tl" rotWithShape="0">
-              <a:srgbClr val="000000">
-                <a:alpha val="40000"/>
-              </a:srgbClr>
-            </a:outerShdw>
-          </a:effectLst>
-          <a:scene3d>
-            <a:camera prst="orthographicFront"/>
-            <a:lightRig rig="twoPt" dir="t">
-              <a:rot lat="0" lon="0" rev="7200000"/>
-            </a:lightRig>
-          </a:scene3d>
-          <a:sp3d>
-            <a:bevelT w="25400" h="19050"/>
-            <a:contourClr>
-              <a:srgbClr val="FFFFFF"/>
-            </a:contourClr>
-          </a:sp3d>
         </p:spPr>
       </p:pic>
       <p:pic>
         <p:nvPicPr>
-          <p:cNvPr id="9" name="Picture 8">
+          <p:cNvPr id="12" name="Picture 11">
             <a:extLst>
               <a:ext uri="{FF2B5EF4-FFF2-40B4-BE49-F238E27FC236}">
-                <a16:creationId xmlns:a16="http://schemas.microsoft.com/office/drawing/2014/main" id="{784BBFE3-D36A-004A-89CC-F601449DF7B0}"/>
+                <a16:creationId xmlns:a16="http://schemas.microsoft.com/office/drawing/2014/main" id="{38BCBF8A-8AEA-40FC-8063-D0351FB6C242}"/>
               </a:ext>
             </a:extLst>
           </p:cNvPr>
@@ -19570,42 +19527,20 @@
         </p:blipFill>
         <p:spPr>
           <a:xfrm>
-            <a:off x="6883628" y="4742651"/>
-            <a:ext cx="4331630" cy="1905917"/>
+            <a:off x="6212977" y="4262520"/>
+            <a:ext cx="5122664" cy="2253972"/>
           </a:xfrm>
           <a:prstGeom prst="rect">
             <a:avLst/>
           </a:prstGeom>
-          <a:solidFill>
-            <a:srgbClr val="FFFFFF">
-              <a:shade val="85000"/>
-            </a:srgbClr>
-          </a:solidFill>
-          <a:ln w="88900" cap="sq">
+          <a:ln>
             <a:solidFill>
-              <a:srgbClr val="FFFFFF"/>
+              <a:schemeClr val="tx1">
+                <a:lumMod val="25000"/>
+                <a:lumOff val="75000"/>
+              </a:schemeClr>
             </a:solidFill>
-            <a:miter lim="800000"/>
           </a:ln>
-          <a:effectLst>
-            <a:outerShdw blurRad="55000" dist="18000" dir="5400000" algn="tl" rotWithShape="0">
-              <a:srgbClr val="000000">
-                <a:alpha val="40000"/>
-              </a:srgbClr>
-            </a:outerShdw>
-          </a:effectLst>
-          <a:scene3d>
-            <a:camera prst="orthographicFront"/>
-            <a:lightRig rig="twoPt" dir="t">
-              <a:rot lat="0" lon="0" rev="7200000"/>
-            </a:lightRig>
-          </a:scene3d>
-          <a:sp3d>
-            <a:bevelT w="25400" h="19050"/>
-            <a:contourClr>
-              <a:srgbClr val="FFFFFF"/>
-            </a:contourClr>
-          </a:sp3d>
         </p:spPr>
       </p:pic>
     </p:spTree>

</xml_diff>

<commit_message>
Update slide deck 3
</commit_message>
<xml_diff>
--- a/03-using.pptx
+++ b/03-using.pptx
@@ -268,7 +268,7 @@
               <a:rPr lang="en-US" smtClean="0">
                 <a:latin typeface="Segoe UI" pitchFamily="34" charset="0"/>
               </a:rPr>
-              <a:t>8/31/2020 5:36 PM</a:t>
+              <a:t>10/16/2021 12:54 PM</a:t>
             </a:fld>
             <a:endParaRPr lang="en-US" dirty="0">
               <a:latin typeface="Segoe UI" pitchFamily="34" charset="0"/>
@@ -565,7 +565,7 @@
           <a:p>
             <a:fld id="{D18B56EA-E28F-4F92-9F16-7A6F2501B303}" type="datetime8">
               <a:rPr lang="en-US" smtClean="0"/>
-              <a:t>8/31/2020 5:36 PM</a:t>
+              <a:t>10/16/2021 12:54 PM</a:t>
             </a:fld>
             <a:endParaRPr lang="en-US" dirty="0"/>
           </a:p>
@@ -948,7 +948,7 @@
           <a:p>
             <a:fld id="{D18B56EA-E28F-4F92-9F16-7A6F2501B303}" type="datetime8">
               <a:rPr lang="en-US" smtClean="0"/>
-              <a:t>8/31/2020 5:36 PM</a:t>
+              <a:t>10/16/2021 12:54 PM</a:t>
             </a:fld>
             <a:endParaRPr lang="en-US" dirty="0"/>
           </a:p>
@@ -1129,7 +1129,7 @@
           <a:p>
             <a:fld id="{D18B56EA-E28F-4F92-9F16-7A6F2501B303}" type="datetime8">
               <a:rPr lang="en-US" smtClean="0"/>
-              <a:t>8/31/2020 5:36 PM</a:t>
+              <a:t>10/16/2021 12:54 PM</a:t>
             </a:fld>
             <a:endParaRPr lang="en-US" dirty="0"/>
           </a:p>
@@ -1341,7 +1341,7 @@
           <a:p>
             <a:fld id="{D18B56EA-E28F-4F92-9F16-7A6F2501B303}" type="datetime8">
               <a:rPr lang="en-US" smtClean="0"/>
-              <a:t>8/31/2020 5:36 PM</a:t>
+              <a:t>10/16/2021 12:54 PM</a:t>
             </a:fld>
             <a:endParaRPr lang="en-US" dirty="0"/>
           </a:p>
@@ -1861,7 +1861,7 @@
           <a:p>
             <a:fld id="{D18B56EA-E28F-4F92-9F16-7A6F2501B303}" type="datetime8">
               <a:rPr lang="en-US" smtClean="0"/>
-              <a:t>8/31/2020 5:36 PM</a:t>
+              <a:t>10/16/2021 12:54 PM</a:t>
             </a:fld>
             <a:endParaRPr lang="en-US" dirty="0"/>
           </a:p>
@@ -2152,7 +2152,7 @@
           <a:p>
             <a:fld id="{D18B56EA-E28F-4F92-9F16-7A6F2501B303}" type="datetime8">
               <a:rPr lang="en-US" smtClean="0"/>
-              <a:t>8/31/2020 5:36 PM</a:t>
+              <a:t>10/16/2021 12:54 PM</a:t>
             </a:fld>
             <a:endParaRPr lang="en-US" dirty="0"/>
           </a:p>
@@ -2333,7 +2333,7 @@
           <a:p>
             <a:fld id="{D18B56EA-E28F-4F92-9F16-7A6F2501B303}" type="datetime8">
               <a:rPr lang="en-US" smtClean="0"/>
-              <a:t>8/31/2020 5:36 PM</a:t>
+              <a:t>10/16/2021 12:54 PM</a:t>
             </a:fld>
             <a:endParaRPr lang="en-US" dirty="0"/>
           </a:p>
@@ -2514,7 +2514,7 @@
           <a:p>
             <a:fld id="{D18B56EA-E28F-4F92-9F16-7A6F2501B303}" type="datetime8">
               <a:rPr lang="en-US" smtClean="0"/>
-              <a:t>8/31/2020 5:36 PM</a:t>
+              <a:t>10/16/2021 12:54 PM</a:t>
             </a:fld>
             <a:endParaRPr lang="en-US" dirty="0"/>
           </a:p>
@@ -2695,7 +2695,7 @@
           <a:p>
             <a:fld id="{D18B56EA-E28F-4F92-9F16-7A6F2501B303}" type="datetime8">
               <a:rPr lang="en-US" smtClean="0"/>
-              <a:t>8/31/2020 5:36 PM</a:t>
+              <a:t>10/16/2021 12:54 PM</a:t>
             </a:fld>
             <a:endParaRPr lang="en-US" dirty="0"/>
           </a:p>
@@ -2876,7 +2876,7 @@
           <a:p>
             <a:fld id="{D18B56EA-E28F-4F92-9F16-7A6F2501B303}" type="datetime8">
               <a:rPr lang="en-US" smtClean="0"/>
-              <a:t>8/31/2020 5:36 PM</a:t>
+              <a:t>10/16/2021 12:54 PM</a:t>
             </a:fld>
             <a:endParaRPr lang="en-US" dirty="0"/>
           </a:p>
@@ -20146,7 +20146,12 @@
             <p:ph type="body" sz="quarter" idx="10"/>
           </p:nvPr>
         </p:nvSpPr>
-        <p:spPr/>
+        <p:spPr>
+          <a:xfrm>
+            <a:off x="464400" y="1212850"/>
+            <a:ext cx="11574000" cy="3868751"/>
+          </a:xfrm>
+        </p:spPr>
         <p:txBody>
           <a:bodyPr/>
           <a:lstStyle/>
@@ -20211,7 +20216,7 @@
           <a:p>
             <a:r>
               <a:rPr lang="en-US" dirty="0"/>
-              <a:t>Build &amp; run web part in the local workbench</a:t>
+              <a:t>Build &amp; run web part in the workbench</a:t>
             </a:r>
           </a:p>
           <a:p>
@@ -20410,16 +20415,6 @@
               </a:spcAft>
             </a:pPr>
             <a:r>
-              <a:rPr lang="sv-SE" altLang="en-US" sz="2400" dirty="0" err="1">
-                <a:solidFill>
-                  <a:schemeClr val="bg1"/>
-                </a:solidFill>
-                <a:latin typeface="Consolas" panose="020B0609020204030204" pitchFamily="49" charset="0"/>
-                <a:cs typeface="Times New Roman" panose="02020603050405020304" pitchFamily="18" charset="0"/>
-              </a:rPr>
-              <a:t>gulp</a:t>
-            </a:r>
-            <a:r>
               <a:rPr lang="sv-SE" altLang="en-US" sz="2400" dirty="0">
                 <a:solidFill>
                   <a:schemeClr val="bg1"/>
@@ -20427,7 +20422,7 @@
                 <a:latin typeface="Consolas" panose="020B0609020204030204" pitchFamily="49" charset="0"/>
                 <a:cs typeface="Times New Roman" panose="02020603050405020304" pitchFamily="18" charset="0"/>
               </a:rPr>
-              <a:t> serve</a:t>
+              <a:t>gulp serve --nobrowser</a:t>
             </a:r>
           </a:p>
         </p:txBody>

</xml_diff>